<commit_message>
Un peu de sérieux !
Je vire Sid, ça le fait moyen pour la soutenance ! ;)
</commit_message>
<xml_diff>
--- a/Documents/Soutenance/diaporama_soutenance.pptx
+++ b/Documents/Soutenance/diaporama_soutenance.pptx
@@ -119,6 +119,11 @@
       </a:defRPr>
     </a:lvl9pPr>
   </p:defaultTextStyle>
+  <p:extLst>
+    <p:ext uri="{EFAFB233-063F-42B5-8137-9DF3F51BA10A}">
+      <p15:sldGuideLst xmlns:p15="http://schemas.microsoft.com/office/powerpoint/2012/main"/>
+    </p:ext>
+  </p:extLst>
 </p:presentation>
 </file>
 
@@ -12796,51 +12801,56 @@
           </a:p>
         </p:txBody>
       </p:sp>
+      <p:sp>
+        <p:nvSpPr>
+          <p:cNvPr id="154" name="CustomShape 3"/>
+          <p:cNvSpPr/>
+          <p:nvPr/>
+        </p:nvSpPr>
+        <p:spPr>
+          <a:xfrm>
+            <a:off x="1152000" y="3600000"/>
+            <a:ext cx="2886840" cy="857880"/>
+          </a:xfrm>
+          <a:prstGeom prst="rect">
+            <a:avLst/>
+          </a:prstGeom>
+          <a:noFill/>
+          <a:ln>
+            <a:noFill/>
+          </a:ln>
+        </p:spPr>
+      </p:sp>
       <p:pic>
         <p:nvPicPr>
-          <p:cNvPr id="153" name="Image 152"/>
-          <p:cNvPicPr/>
+          <p:cNvPr id="2" name="Image 1"/>
+          <p:cNvPicPr>
+            <a:picLocks noChangeAspect="1"/>
+          </p:cNvPicPr>
           <p:nvPr/>
         </p:nvPicPr>
         <p:blipFill>
-          <a:blip r:embed="rId2"/>
+          <a:blip r:embed="rId2">
+            <a:extLst>
+              <a:ext uri="{28A0092B-C50C-407E-A947-70E740481C1C}">
+                <a14:useLocalDpi xmlns:a14="http://schemas.microsoft.com/office/drawing/2010/main" val="0"/>
+              </a:ext>
+            </a:extLst>
+          </a:blip>
           <a:stretch>
             <a:fillRect/>
           </a:stretch>
         </p:blipFill>
         <p:spPr>
           <a:xfrm>
-            <a:off x="4248000" y="1224000"/>
-            <a:ext cx="4049280" cy="5265360"/>
-          </a:xfrm>
-          <a:prstGeom prst="rect">
-            <a:avLst/>
-          </a:prstGeom>
-          <a:ln>
-            <a:noFill/>
-          </a:ln>
+            <a:off x="4425017" y="1098339"/>
+            <a:ext cx="3495470" cy="5003321"/>
+          </a:xfrm>
+          <a:prstGeom prst="rect">
+            <a:avLst/>
+          </a:prstGeom>
         </p:spPr>
       </p:pic>
-      <p:sp>
-        <p:nvSpPr>
-          <p:cNvPr id="154" name="CustomShape 3"/>
-          <p:cNvSpPr/>
-          <p:nvPr/>
-        </p:nvSpPr>
-        <p:spPr>
-          <a:xfrm>
-            <a:off x="1152000" y="3600000"/>
-            <a:ext cx="2886840" cy="857880"/>
-          </a:xfrm>
-          <a:prstGeom prst="rect">
-            <a:avLst/>
-          </a:prstGeom>
-          <a:noFill/>
-          <a:ln>
-            <a:noFill/>
-          </a:ln>
-        </p:spPr>
-      </p:sp>
     </p:spTree>
   </p:cSld>
   <p:clrMapOvr>

</xml_diff>